<commit_message>
edited parameters of bm25 and added some more tests
</commit_message>
<xml_diff>
--- a/docs/presentation.pptx
+++ b/docs/presentation.pptx
@@ -4616,26 +4616,7 @@
                 <a:latin typeface="OCR A Extended" panose="02010509020102010303" pitchFamily="50" charset="0"/>
                 <a:ea typeface="SimSun" panose="02010600030101010101" pitchFamily="2" charset="-122"/>
               </a:rPr>
-              <a:t>Retrieval </a:t>
-            </a:r>
-            <a:br>
-              <a:rPr lang="en-US" b="1" dirty="0">
-                <a:solidFill>
-                  <a:srgbClr val="FFFFFF"/>
-                </a:solidFill>
-                <a:latin typeface="OCR A Extended" panose="02010509020102010303" pitchFamily="50" charset="0"/>
-                <a:ea typeface="SimSun" panose="02010600030101010101" pitchFamily="2" charset="-122"/>
-              </a:rPr>
-            </a:br>
-            <a:r>
-              <a:rPr lang="en-US" b="1" dirty="0">
-                <a:solidFill>
-                  <a:srgbClr val="FFFFFF"/>
-                </a:solidFill>
-                <a:latin typeface="OCR A Extended" panose="02010509020102010303" pitchFamily="50" charset="0"/>
-                <a:ea typeface="SimSun" panose="02010600030101010101" pitchFamily="2" charset="-122"/>
-              </a:rPr>
-              <a:t>Engine</a:t>
+              <a:t>Search Engine</a:t>
             </a:r>
           </a:p>
         </p:txBody>
@@ -6069,7 +6050,7 @@
                 <a:ea typeface="Times New Roman" panose="02020603050405020304" pitchFamily="18" charset="0"/>
                 <a:cs typeface="Arial" panose="020B0604020202020204" pitchFamily="34" charset="0"/>
               </a:rPr>
-              <a:t>k1=1.2, k3=1, b=0.75</a:t>
+              <a:t>k1=1.2, k3=1, b=0.5</a:t>
             </a:r>
             <a:r>
               <a:rPr lang="he-IL" sz="1800" dirty="0">
@@ -6165,7 +6146,7 @@
           <p:nvPr>
             <p:extLst>
               <p:ext uri="{D42A27DB-BD31-4B8C-83A1-F6EECF244321}">
-                <p14:modId xmlns:p14="http://schemas.microsoft.com/office/powerpoint/2010/main" val="2753587622"/>
+                <p14:modId xmlns:p14="http://schemas.microsoft.com/office/powerpoint/2010/main" val="1031550926"/>
               </p:ext>
             </p:extLst>
           </p:nvPr>
@@ -6330,7 +6311,7 @@
                       <a:pPr algn="ctr" rtl="1"/>
                       <a:r>
                         <a:rPr lang="en-US" dirty="0"/>
-                        <a:t>3.4</a:t>
+                        <a:t>3.16</a:t>
                       </a:r>
                       <a:endParaRPr lang="he-IL" dirty="0"/>
                     </a:p>
@@ -6345,7 +6326,7 @@
                       <a:pPr algn="ctr" rtl="1"/>
                       <a:r>
                         <a:rPr lang="en-US" dirty="0"/>
-                        <a:t>0.305</a:t>
+                        <a:t>0.333</a:t>
                       </a:r>
                       <a:endParaRPr lang="he-IL" dirty="0"/>
                     </a:p>
@@ -6360,7 +6341,7 @@
                       <a:pPr algn="ctr" rtl="1"/>
                       <a:r>
                         <a:rPr lang="en-US" dirty="0"/>
-                        <a:t>0.52</a:t>
+                        <a:t>0.56</a:t>
                       </a:r>
                       <a:endParaRPr lang="he-IL" dirty="0"/>
                     </a:p>
@@ -6375,7 +6356,7 @@
                       <a:pPr algn="ctr" rtl="1"/>
                       <a:r>
                         <a:rPr lang="he-IL" dirty="0"/>
-                        <a:t>0.45</a:t>
+                        <a:t>0.46</a:t>
                       </a:r>
                     </a:p>
                   </a:txBody>
@@ -6389,7 +6370,7 @@
                       <a:pPr algn="ctr" rtl="1"/>
                       <a:r>
                         <a:rPr lang="en-US" dirty="0"/>
-                        <a:t>0.229</a:t>
+                        <a:t>0.252</a:t>
                       </a:r>
                       <a:endParaRPr lang="he-IL" dirty="0"/>
                     </a:p>
@@ -6404,7 +6385,7 @@
                       <a:pPr algn="ctr" rtl="1"/>
                       <a:r>
                         <a:rPr lang="en-US" dirty="0"/>
-                        <a:t>0.108</a:t>
+                        <a:t>0.113</a:t>
                       </a:r>
                       <a:endParaRPr lang="he-IL" dirty="0"/>
                     </a:p>

</xml_diff>